<commit_message>
change order of ppt responsibilities
</commit_message>
<xml_diff>
--- a/usabilityEngineering/A1/literatureResearch.pptx
+++ b/usabilityEngineering/A1/literatureResearch.pptx
@@ -6,8 +6,8 @@
   </p:sldMasterIdLst>
   <p:sldIdLst>
     <p:sldId id="256" r:id="rId2"/>
-    <p:sldId id="261" r:id="rId3"/>
-    <p:sldId id="262" r:id="rId4"/>
+    <p:sldId id="262" r:id="rId3"/>
+    <p:sldId id="261" r:id="rId4"/>
     <p:sldId id="263" r:id="rId5"/>
     <p:sldId id="264" r:id="rId6"/>
     <p:sldId id="265" r:id="rId7"/>
@@ -6094,7 +6094,7 @@
                   </a:schemeClr>
                 </a:solidFill>
               </a:rPr>
-              <a:t>Shopping in physical stores</a:t>
+              <a:t>An exploratory study of grocery shopping stressors</a:t>
             </a:r>
           </a:p>
         </p:txBody>
@@ -6111,8 +6111,8 @@
         </p:nvSpPr>
         <p:spPr>
           <a:xfrm>
-            <a:off x="1143000" y="2721483"/>
-            <a:ext cx="8210550" cy="1332000"/>
+            <a:off x="1143000" y="3032014"/>
+            <a:ext cx="8210550" cy="2474794"/>
           </a:xfrm>
         </p:spPr>
         <p:txBody>
@@ -6123,100 +6123,25 @@
           <a:p>
             <a:r>
               <a:rPr lang="en-US" dirty="0"/>
-              <a:t>Decisions depend on shop knowledge and time</a:t>
-            </a:r>
-          </a:p>
-          <a:p>
-            <a:pPr lvl="1"/>
+              <a:t>Time pressure is seen as the main cause of shopping stress.</a:t>
+            </a:r>
+          </a:p>
+          <a:p>
+            <a:endParaRPr lang="en-US" sz="600" dirty="0"/>
+          </a:p>
+          <a:p>
             <a:r>
               <a:rPr lang="en-US" dirty="0"/>
-              <a:t>Failure to make the intended purchases (stress)</a:t>
-            </a:r>
-          </a:p>
-          <a:p>
-            <a:pPr lvl="1"/>
+              <a:t>Most respondents associate more stress with grocery shopping than other forms of shopping.</a:t>
+            </a:r>
+          </a:p>
+          <a:p>
+            <a:endParaRPr lang="en-US" sz="600" dirty="0"/>
+          </a:p>
+          <a:p>
             <a:r>
               <a:rPr lang="en-US" dirty="0"/>
-              <a:t>Unplanned Buying</a:t>
-            </a:r>
-          </a:p>
-          <a:p>
-            <a:pPr lvl="1"/>
-            <a:r>
-              <a:rPr lang="en-US" dirty="0"/>
-              <a:t>Brand/product switching (difficulty in locating)</a:t>
-            </a:r>
-          </a:p>
-          <a:p>
-            <a:endParaRPr lang="en-US" dirty="0"/>
-          </a:p>
-        </p:txBody>
-      </p:sp>
-      <p:sp>
-        <p:nvSpPr>
-          <p:cNvPr id="5" name="Textplatzhalter 4"/>
-          <p:cNvSpPr>
-            <a:spLocks noGrp="1"/>
-          </p:cNvSpPr>
-          <p:nvPr>
-            <p:ph type="body" sz="quarter" idx="3"/>
-          </p:nvPr>
-        </p:nvSpPr>
-        <p:spPr>
-          <a:xfrm>
-            <a:off x="1143000" y="4395455"/>
-            <a:ext cx="7296150" cy="756000"/>
-          </a:xfrm>
-        </p:spPr>
-        <p:txBody>
-          <a:bodyPr/>
-          <a:lstStyle/>
-          <a:p>
-            <a:r>
-              <a:rPr lang="en-US" dirty="0">
-                <a:solidFill>
-                  <a:schemeClr val="accent4">
-                    <a:lumMod val="75000"/>
-                  </a:schemeClr>
-                </a:solidFill>
-              </a:rPr>
-              <a:t>Online grocery shopping</a:t>
-            </a:r>
-          </a:p>
-        </p:txBody>
-      </p:sp>
-      <p:sp>
-        <p:nvSpPr>
-          <p:cNvPr id="6" name="Inhaltsplatzhalter 5"/>
-          <p:cNvSpPr>
-            <a:spLocks noGrp="1"/>
-          </p:cNvSpPr>
-          <p:nvPr>
-            <p:ph sz="quarter" idx="4"/>
-          </p:nvPr>
-        </p:nvSpPr>
-        <p:spPr>
-          <a:xfrm>
-            <a:off x="1143000" y="5115425"/>
-            <a:ext cx="8210550" cy="1332000"/>
-          </a:xfrm>
-        </p:spPr>
-        <p:txBody>
-          <a:bodyPr>
-            <a:normAutofit/>
-          </a:bodyPr>
-          <a:lstStyle/>
-          <a:p>
-            <a:r>
-              <a:rPr lang="en-US" dirty="0"/>
-              <a:t>Similar to planning with ELISA</a:t>
-            </a:r>
-          </a:p>
-          <a:p>
-            <a:pPr lvl="1"/>
-            <a:r>
-              <a:rPr lang="en-US" dirty="0"/>
-              <a:t>Decisions are made in advance depending on  product availability, prices and special offers</a:t>
+              <a:t>One important group of stressors is linked to overpriced goods, lack of money and too much choice.</a:t>
             </a:r>
           </a:p>
         </p:txBody>
@@ -6269,10 +6194,98 @@
           </a:extLst>
         </p:spPr>
       </p:pic>
+      <p:pic>
+        <p:nvPicPr>
+          <p:cNvPr id="10" name="Bild 9"/>
+          <p:cNvPicPr>
+            <a:picLocks noChangeAspect="1"/>
+          </p:cNvPicPr>
+          <p:nvPr/>
+        </p:nvPicPr>
+        <p:blipFill>
+          <a:blip r:embed="rId3">
+            <a:extLst>
+              <a:ext uri="{28A0092B-C50C-407E-A947-70E740481C1C}">
+                <a14:useLocalDpi xmlns:a14="http://schemas.microsoft.com/office/drawing/2010/main" val="0"/>
+              </a:ext>
+            </a:extLst>
+          </a:blip>
+          <a:stretch>
+            <a:fillRect/>
+          </a:stretch>
+        </p:blipFill>
+        <p:spPr>
+          <a:xfrm>
+            <a:off x="8918901" y="1122197"/>
+            <a:ext cx="2751438" cy="2751438"/>
+          </a:xfrm>
+          <a:prstGeom prst="rect">
+            <a:avLst/>
+          </a:prstGeom>
+        </p:spPr>
+      </p:pic>
+      <p:sp>
+        <p:nvSpPr>
+          <p:cNvPr id="11" name="Textfeld 10"/>
+          <p:cNvSpPr txBox="1"/>
+          <p:nvPr/>
+        </p:nvSpPr>
+        <p:spPr>
+          <a:xfrm>
+            <a:off x="1143000" y="5781311"/>
+            <a:ext cx="3935436" cy="369332"/>
+          </a:xfrm>
+          <a:prstGeom prst="rect">
+            <a:avLst/>
+          </a:prstGeom>
+          <a:noFill/>
+        </p:spPr>
+        <p:txBody>
+          <a:bodyPr wrap="none" rtlCol="0">
+            <a:spAutoFit/>
+          </a:bodyPr>
+          <a:lstStyle/>
+          <a:p>
+            <a:r>
+              <a:rPr lang="de-DE" dirty="0">
+                <a:solidFill>
+                  <a:schemeClr val="tx1">
+                    <a:lumMod val="65000"/>
+                    <a:lumOff val="35000"/>
+                  </a:schemeClr>
+                </a:solidFill>
+              </a:rPr>
+              <a:t>Russell </a:t>
+            </a:r>
+            <a:r>
+              <a:rPr lang="de-DE" dirty="0" err="1">
+                <a:solidFill>
+                  <a:schemeClr val="tx1">
+                    <a:lumMod val="65000"/>
+                    <a:lumOff val="35000"/>
+                  </a:schemeClr>
+                </a:solidFill>
+              </a:rPr>
+              <a:t>Aylott</a:t>
+            </a:r>
+            <a:r>
+              <a:rPr lang="de-DE" dirty="0">
+                <a:solidFill>
+                  <a:schemeClr val="tx1">
+                    <a:lumMod val="65000"/>
+                    <a:lumOff val="35000"/>
+                  </a:schemeClr>
+                </a:solidFill>
+              </a:rPr>
+              <a:t>, Vincent-Wayne Mitchell</a:t>
+            </a:r>
+          </a:p>
+        </p:txBody>
+      </p:sp>
     </p:spTree>
     <p:extLst>
       <p:ext uri="{BB962C8B-B14F-4D97-AF65-F5344CB8AC3E}">
-        <p14:creationId xmlns:p14="http://schemas.microsoft.com/office/powerpoint/2010/main" val="2135751425"/>
+        <p14:creationId xmlns:p14="http://schemas.microsoft.com/office/powerpoint/2010/main" val="4101457644"/>
       </p:ext>
     </p:extLst>
   </p:cSld>
@@ -6349,7 +6362,7 @@
                   </a:schemeClr>
                 </a:solidFill>
               </a:rPr>
-              <a:t>An exploratory study of grocery shopping stressors</a:t>
+              <a:t>Shopping in physical stores</a:t>
             </a:r>
           </a:p>
         </p:txBody>
@@ -6366,8 +6379,8 @@
         </p:nvSpPr>
         <p:spPr>
           <a:xfrm>
-            <a:off x="1143000" y="3032014"/>
-            <a:ext cx="8210550" cy="2474794"/>
+            <a:off x="1143000" y="2721483"/>
+            <a:ext cx="8210550" cy="1332000"/>
           </a:xfrm>
         </p:spPr>
         <p:txBody>
@@ -6378,25 +6391,100 @@
           <a:p>
             <a:r>
               <a:rPr lang="en-US" dirty="0"/>
-              <a:t>Time pressure is seen as the main cause of shopping stress.</a:t>
-            </a:r>
-          </a:p>
-          <a:p>
-            <a:endParaRPr lang="en-US" sz="600" dirty="0"/>
-          </a:p>
-          <a:p>
+              <a:t>Decisions depend on shop knowledge and time</a:t>
+            </a:r>
+          </a:p>
+          <a:p>
+            <a:pPr lvl="1"/>
             <a:r>
               <a:rPr lang="en-US" dirty="0"/>
-              <a:t>Most respondents associate more stress with grocery shopping than other forms of shopping.</a:t>
-            </a:r>
-          </a:p>
-          <a:p>
-            <a:endParaRPr lang="en-US" sz="600" dirty="0"/>
-          </a:p>
-          <a:p>
+              <a:t>Failure to make the intended purchases (stress)</a:t>
+            </a:r>
+          </a:p>
+          <a:p>
+            <a:pPr lvl="1"/>
             <a:r>
               <a:rPr lang="en-US" dirty="0"/>
-              <a:t>One important group of stressors is linked to overpriced goods, lack of money and too much choice.</a:t>
+              <a:t>Unplanned Buying</a:t>
+            </a:r>
+          </a:p>
+          <a:p>
+            <a:pPr lvl="1"/>
+            <a:r>
+              <a:rPr lang="en-US" dirty="0"/>
+              <a:t>Brand/product switching (difficulty in locating)</a:t>
+            </a:r>
+          </a:p>
+          <a:p>
+            <a:endParaRPr lang="en-US" dirty="0"/>
+          </a:p>
+        </p:txBody>
+      </p:sp>
+      <p:sp>
+        <p:nvSpPr>
+          <p:cNvPr id="5" name="Textplatzhalter 4"/>
+          <p:cNvSpPr>
+            <a:spLocks noGrp="1"/>
+          </p:cNvSpPr>
+          <p:nvPr>
+            <p:ph type="body" sz="quarter" idx="3"/>
+          </p:nvPr>
+        </p:nvSpPr>
+        <p:spPr>
+          <a:xfrm>
+            <a:off x="1143000" y="4395455"/>
+            <a:ext cx="7296150" cy="756000"/>
+          </a:xfrm>
+        </p:spPr>
+        <p:txBody>
+          <a:bodyPr/>
+          <a:lstStyle/>
+          <a:p>
+            <a:r>
+              <a:rPr lang="en-US" dirty="0">
+                <a:solidFill>
+                  <a:schemeClr val="accent4">
+                    <a:lumMod val="75000"/>
+                  </a:schemeClr>
+                </a:solidFill>
+              </a:rPr>
+              <a:t>Online grocery shopping</a:t>
+            </a:r>
+          </a:p>
+        </p:txBody>
+      </p:sp>
+      <p:sp>
+        <p:nvSpPr>
+          <p:cNvPr id="6" name="Inhaltsplatzhalter 5"/>
+          <p:cNvSpPr>
+            <a:spLocks noGrp="1"/>
+          </p:cNvSpPr>
+          <p:nvPr>
+            <p:ph sz="quarter" idx="4"/>
+          </p:nvPr>
+        </p:nvSpPr>
+        <p:spPr>
+          <a:xfrm>
+            <a:off x="1143000" y="5115425"/>
+            <a:ext cx="8210550" cy="1332000"/>
+          </a:xfrm>
+        </p:spPr>
+        <p:txBody>
+          <a:bodyPr>
+            <a:normAutofit/>
+          </a:bodyPr>
+          <a:lstStyle/>
+          <a:p>
+            <a:r>
+              <a:rPr lang="en-US" dirty="0"/>
+              <a:t>Similar to planning with ELISA</a:t>
+            </a:r>
+          </a:p>
+          <a:p>
+            <a:pPr lvl="1"/>
+            <a:r>
+              <a:rPr lang="en-US" dirty="0"/>
+              <a:t>Decisions are made in advance depending on  product availability, prices and special offers</a:t>
             </a:r>
           </a:p>
         </p:txBody>
@@ -6449,98 +6537,10 @@
           </a:extLst>
         </p:spPr>
       </p:pic>
-      <p:pic>
-        <p:nvPicPr>
-          <p:cNvPr id="10" name="Bild 9"/>
-          <p:cNvPicPr>
-            <a:picLocks noChangeAspect="1"/>
-          </p:cNvPicPr>
-          <p:nvPr/>
-        </p:nvPicPr>
-        <p:blipFill>
-          <a:blip r:embed="rId3">
-            <a:extLst>
-              <a:ext uri="{28A0092B-C50C-407E-A947-70E740481C1C}">
-                <a14:useLocalDpi xmlns:a14="http://schemas.microsoft.com/office/drawing/2010/main" val="0"/>
-              </a:ext>
-            </a:extLst>
-          </a:blip>
-          <a:stretch>
-            <a:fillRect/>
-          </a:stretch>
-        </p:blipFill>
-        <p:spPr>
-          <a:xfrm>
-            <a:off x="8918901" y="1122197"/>
-            <a:ext cx="2751438" cy="2751438"/>
-          </a:xfrm>
-          <a:prstGeom prst="rect">
-            <a:avLst/>
-          </a:prstGeom>
-        </p:spPr>
-      </p:pic>
-      <p:sp>
-        <p:nvSpPr>
-          <p:cNvPr id="11" name="Textfeld 10"/>
-          <p:cNvSpPr txBox="1"/>
-          <p:nvPr/>
-        </p:nvSpPr>
-        <p:spPr>
-          <a:xfrm>
-            <a:off x="1143000" y="5781311"/>
-            <a:ext cx="3935436" cy="369332"/>
-          </a:xfrm>
-          <a:prstGeom prst="rect">
-            <a:avLst/>
-          </a:prstGeom>
-          <a:noFill/>
-        </p:spPr>
-        <p:txBody>
-          <a:bodyPr wrap="none" rtlCol="0">
-            <a:spAutoFit/>
-          </a:bodyPr>
-          <a:lstStyle/>
-          <a:p>
-            <a:r>
-              <a:rPr lang="de-DE" dirty="0">
-                <a:solidFill>
-                  <a:schemeClr val="tx1">
-                    <a:lumMod val="65000"/>
-                    <a:lumOff val="35000"/>
-                  </a:schemeClr>
-                </a:solidFill>
-              </a:rPr>
-              <a:t>Russell </a:t>
-            </a:r>
-            <a:r>
-              <a:rPr lang="de-DE" dirty="0" err="1">
-                <a:solidFill>
-                  <a:schemeClr val="tx1">
-                    <a:lumMod val="65000"/>
-                    <a:lumOff val="35000"/>
-                  </a:schemeClr>
-                </a:solidFill>
-              </a:rPr>
-              <a:t>Aylott</a:t>
-            </a:r>
-            <a:r>
-              <a:rPr lang="de-DE" dirty="0">
-                <a:solidFill>
-                  <a:schemeClr val="tx1">
-                    <a:lumMod val="65000"/>
-                    <a:lumOff val="35000"/>
-                  </a:schemeClr>
-                </a:solidFill>
-              </a:rPr>
-              <a:t>, Vincent-Wayne Mitchell</a:t>
-            </a:r>
-          </a:p>
-        </p:txBody>
-      </p:sp>
     </p:spTree>
     <p:extLst>
       <p:ext uri="{BB962C8B-B14F-4D97-AF65-F5344CB8AC3E}">
-        <p14:creationId xmlns:p14="http://schemas.microsoft.com/office/powerpoint/2010/main" val="4101457644"/>
+        <p14:creationId xmlns:p14="http://schemas.microsoft.com/office/powerpoint/2010/main" val="2135751425"/>
       </p:ext>
     </p:extLst>
   </p:cSld>

</xml_diff>